<commit_message>
fix intro and mdr
</commit_message>
<xml_diff>
--- a/Video/intro.pptx
+++ b/Video/intro.pptx
@@ -1986,7 +1986,7 @@
             </a:br>
             <a:r>
               <a:rPr lang="en-US" dirty="0"/>
-              <a:t> "</a:t>
+              <a:t> “</a:t>
             </a:r>
             <a:r>
               <a:rPr lang="en-US" dirty="0">
@@ -2042,7 +2042,7 @@
             </a:r>
             <a:r>
               <a:rPr lang="en-US" dirty="0"/>
-              <a:t>be“</a:t>
+              <a:t>be”</a:t>
             </a:r>
             <a:br>
               <a:rPr lang="en-US" dirty="0"/>
@@ -2499,11 +2499,11 @@
               <a:rPr lang="en-US" dirty="0"/>
             </a:br>
             <a:r>
-              <a:rPr lang="en-US" dirty="0"/>
-              <a:t> "</a:t>
-            </a:r>
-            <a:r>
-              <a:rPr lang="en-US" dirty="0">
+              <a:rPr lang="en-US"/>
+              <a:t> “</a:t>
+            </a:r>
+            <a:r>
+              <a:rPr lang="en-US">
                 <a:solidFill>
                   <a:srgbClr val="00549F"/>
                 </a:solidFill>
@@ -2511,7 +2511,7 @@
               <a:t>H</a:t>
             </a:r>
             <a:r>
-              <a:rPr lang="en-US" dirty="0"/>
+              <a:rPr lang="en-US"/>
               <a:t>igh </a:t>
             </a:r>
             <a:r>
@@ -2575,13 +2575,13 @@
   <p:clrMapOvr>
     <a:masterClrMapping/>
   </p:clrMapOvr>
-  <mc:AlternateContent xmlns:mc="http://schemas.openxmlformats.org/markup-compatibility/2006">
-    <mc:Choice xmlns:p14="http://schemas.microsoft.com/office/powerpoint/2010/main" Requires="p14">
+  <mc:AlternateContent xmlns:mc="http://schemas.openxmlformats.org/markup-compatibility/2006" xmlns:p14="http://schemas.microsoft.com/office/powerpoint/2010/main">
+    <mc:Choice Requires="p14">
       <p:transition spd="slow" p14:dur="1750" advTm="2289">
         <p:fade/>
       </p:transition>
     </mc:Choice>
-    <mc:Fallback>
+    <mc:Fallback xmlns="">
       <p:transition spd="slow" advTm="2289">
         <p:fade/>
       </p:transition>

</xml_diff>